<commit_message>
Update pptx file in docs.
</commit_message>
<xml_diff>
--- a/docs/cantai.pptx
+++ b/docs/cantai.pptx
@@ -282,7 +282,7 @@
           <a:p>
             <a:fld id="{D997B5FA-0921-464F-AAE1-844C04324D75}" type="datetimeFigureOut">
               <a:rPr lang="zh-CN" altLang="en-US" smtClean="0"/>
-              <a:t>2023/9/8</a:t>
+              <a:t>2023/9/12</a:t>
             </a:fld>
             <a:endParaRPr lang="zh-CN" altLang="en-US"/>
           </a:p>
@@ -450,7 +450,7 @@
           <a:p>
             <a:fld id="{D997B5FA-0921-464F-AAE1-844C04324D75}" type="datetimeFigureOut">
               <a:rPr lang="zh-CN" altLang="en-US" smtClean="0"/>
-              <a:t>2023/9/8</a:t>
+              <a:t>2023/9/12</a:t>
             </a:fld>
             <a:endParaRPr lang="zh-CN" altLang="en-US"/>
           </a:p>
@@ -628,7 +628,7 @@
           <a:p>
             <a:fld id="{D997B5FA-0921-464F-AAE1-844C04324D75}" type="datetimeFigureOut">
               <a:rPr lang="zh-CN" altLang="en-US" smtClean="0"/>
-              <a:t>2023/9/8</a:t>
+              <a:t>2023/9/12</a:t>
             </a:fld>
             <a:endParaRPr lang="zh-CN" altLang="en-US"/>
           </a:p>
@@ -796,7 +796,7 @@
           <a:p>
             <a:fld id="{D997B5FA-0921-464F-AAE1-844C04324D75}" type="datetimeFigureOut">
               <a:rPr lang="zh-CN" altLang="en-US" smtClean="0"/>
-              <a:t>2023/9/8</a:t>
+              <a:t>2023/9/12</a:t>
             </a:fld>
             <a:endParaRPr lang="zh-CN" altLang="en-US"/>
           </a:p>
@@ -1041,7 +1041,7 @@
           <a:p>
             <a:fld id="{D997B5FA-0921-464F-AAE1-844C04324D75}" type="datetimeFigureOut">
               <a:rPr lang="zh-CN" altLang="en-US" smtClean="0"/>
-              <a:t>2023/9/8</a:t>
+              <a:t>2023/9/12</a:t>
             </a:fld>
             <a:endParaRPr lang="zh-CN" altLang="en-US"/>
           </a:p>
@@ -1270,7 +1270,7 @@
           <a:p>
             <a:fld id="{D997B5FA-0921-464F-AAE1-844C04324D75}" type="datetimeFigureOut">
               <a:rPr lang="zh-CN" altLang="en-US" smtClean="0"/>
-              <a:t>2023/9/8</a:t>
+              <a:t>2023/9/12</a:t>
             </a:fld>
             <a:endParaRPr lang="zh-CN" altLang="en-US"/>
           </a:p>
@@ -1634,7 +1634,7 @@
           <a:p>
             <a:fld id="{D997B5FA-0921-464F-AAE1-844C04324D75}" type="datetimeFigureOut">
               <a:rPr lang="zh-CN" altLang="en-US" smtClean="0"/>
-              <a:t>2023/9/8</a:t>
+              <a:t>2023/9/12</a:t>
             </a:fld>
             <a:endParaRPr lang="zh-CN" altLang="en-US"/>
           </a:p>
@@ -1751,7 +1751,7 @@
           <a:p>
             <a:fld id="{D997B5FA-0921-464F-AAE1-844C04324D75}" type="datetimeFigureOut">
               <a:rPr lang="zh-CN" altLang="en-US" smtClean="0"/>
-              <a:t>2023/9/8</a:t>
+              <a:t>2023/9/12</a:t>
             </a:fld>
             <a:endParaRPr lang="zh-CN" altLang="en-US"/>
           </a:p>
@@ -1846,7 +1846,7 @@
           <a:p>
             <a:fld id="{D997B5FA-0921-464F-AAE1-844C04324D75}" type="datetimeFigureOut">
               <a:rPr lang="zh-CN" altLang="en-US" smtClean="0"/>
-              <a:t>2023/9/8</a:t>
+              <a:t>2023/9/12</a:t>
             </a:fld>
             <a:endParaRPr lang="zh-CN" altLang="en-US"/>
           </a:p>
@@ -2121,7 +2121,7 @@
           <a:p>
             <a:fld id="{D997B5FA-0921-464F-AAE1-844C04324D75}" type="datetimeFigureOut">
               <a:rPr lang="zh-CN" altLang="en-US" smtClean="0"/>
-              <a:t>2023/9/8</a:t>
+              <a:t>2023/9/12</a:t>
             </a:fld>
             <a:endParaRPr lang="zh-CN" altLang="en-US"/>
           </a:p>
@@ -2373,7 +2373,7 @@
           <a:p>
             <a:fld id="{D997B5FA-0921-464F-AAE1-844C04324D75}" type="datetimeFigureOut">
               <a:rPr lang="zh-CN" altLang="en-US" smtClean="0"/>
-              <a:t>2023/9/8</a:t>
+              <a:t>2023/9/12</a:t>
             </a:fld>
             <a:endParaRPr lang="zh-CN" altLang="en-US"/>
           </a:p>
@@ -2584,7 +2584,7 @@
           <a:p>
             <a:fld id="{D997B5FA-0921-464F-AAE1-844C04324D75}" type="datetimeFigureOut">
               <a:rPr lang="zh-CN" altLang="en-US" smtClean="0"/>
-              <a:t>2023/9/8</a:t>
+              <a:t>2023/9/12</a:t>
             </a:fld>
             <a:endParaRPr lang="zh-CN" altLang="en-US"/>
           </a:p>
@@ -3431,10 +3431,10 @@
       </p:sp>
       <p:pic>
         <p:nvPicPr>
-          <p:cNvPr id="5" name="图片 4">
+          <p:cNvPr id="3" name="图片 2">
             <a:extLst>
               <a:ext uri="{FF2B5EF4-FFF2-40B4-BE49-F238E27FC236}">
-                <a16:creationId xmlns:a16="http://schemas.microsoft.com/office/drawing/2014/main" id="{3D2CC8EB-2F09-E4DD-5146-7B630458BD61}"/>
+                <a16:creationId xmlns:a16="http://schemas.microsoft.com/office/drawing/2014/main" id="{D96C7071-83FF-23DA-C0A6-86796D8EF206}"/>
               </a:ext>
             </a:extLst>
           </p:cNvPr>
@@ -3457,8 +3457,8 @@
         </p:blipFill>
         <p:spPr>
           <a:xfrm>
-            <a:off x="1809445" y="1575794"/>
-            <a:ext cx="8573110" cy="4789226"/>
+            <a:off x="795337" y="2250932"/>
+            <a:ext cx="10601325" cy="4333875"/>
           </a:xfrm>
           <a:prstGeom prst="rect">
             <a:avLst/>
@@ -17584,7 +17584,7 @@
                 <a:latin typeface="SimHei"/>
                 <a:cs typeface="SimHei"/>
               </a:rPr>
-              <a:t>：解决存储引擎的事务并发，实现</a:t>
+              <a:t>：隔离多个事务，实现</a:t>
             </a:r>
             <a:r>
               <a:rPr lang="en-US" altLang="zh-CN" dirty="0">
@@ -17604,7 +17604,7 @@
                 <a:latin typeface="SimHei"/>
                 <a:cs typeface="SimHei"/>
               </a:rPr>
-              <a:t>特性</a:t>
+              <a:t>特性。锁定数据库的逻辑内容，支持复杂的调度策略。</a:t>
             </a:r>
             <a:endParaRPr lang="en-US" altLang="zh-CN" dirty="0">
               <a:solidFill>
@@ -17640,7 +17640,7 @@
                 <a:latin typeface="SimHei"/>
                 <a:cs typeface="SimHei"/>
               </a:rPr>
-              <a:t>：解决存储引擎的并发操作，实现线程安全</a:t>
+              <a:t>：保护内存中数据结构，实现线程安全，轻量级，通过规定的顺序申请以避免死锁。</a:t>
             </a:r>
             <a:endParaRPr lang="en-US" altLang="zh-CN" dirty="0">
               <a:solidFill>
@@ -17667,7 +17667,7 @@
           <p:nvPr>
             <p:extLst>
               <p:ext uri="{D42A27DB-BD31-4B8C-83A1-F6EECF244321}">
-                <p14:modId xmlns:p14="http://schemas.microsoft.com/office/powerpoint/2010/main" val="2875960716"/>
+                <p14:modId xmlns:p14="http://schemas.microsoft.com/office/powerpoint/2010/main" val="1959587765"/>
               </p:ext>
             </p:extLst>
           </p:nvPr>
@@ -17853,7 +17853,7 @@
                       <a:pPr algn="ctr"/>
                       <a:r>
                         <a:rPr lang="zh-CN" altLang="en-US" dirty="0"/>
-                        <a:t>库中数据</a:t>
+                        <a:t>数据库内容</a:t>
                       </a:r>
                     </a:p>
                   </a:txBody>

</xml_diff>